<commit_message>
Added list creation functionality for service level agreements list, unittest passing
</commit_message>
<xml_diff>
--- a/docfiles/SLAPP.WIREFRAME.pptx
+++ b/docfiles/SLAPP.WIREFRAME.pptx
@@ -5,15 +5,16 @@
     <p:sldMasterId id="2147483648" r:id="rId1"/>
   </p:sldMasterIdLst>
   <p:notesMasterIdLst>
-    <p:notesMasterId r:id="rId8"/>
+    <p:notesMasterId r:id="rId9"/>
   </p:notesMasterIdLst>
   <p:sldIdLst>
     <p:sldId id="256" r:id="rId2"/>
-    <p:sldId id="258" r:id="rId3"/>
-    <p:sldId id="259" r:id="rId4"/>
-    <p:sldId id="261" r:id="rId5"/>
-    <p:sldId id="257" r:id="rId6"/>
-    <p:sldId id="260" r:id="rId7"/>
+    <p:sldId id="262" r:id="rId3"/>
+    <p:sldId id="258" r:id="rId4"/>
+    <p:sldId id="259" r:id="rId5"/>
+    <p:sldId id="261" r:id="rId6"/>
+    <p:sldId id="257" r:id="rId7"/>
+    <p:sldId id="260" r:id="rId8"/>
   </p:sldIdLst>
   <p:sldSz cx="9144000" cy="6858000" type="screen4x3"/>
   <p:notesSz cx="6858000" cy="9144000"/>
@@ -197,7 +198,7 @@
           <a:p>
             <a:fld id="{3E13AF57-E10C-8343-8963-8E182F04C956}" type="datetimeFigureOut">
               <a:rPr lang="en-US" smtClean="0"/>
-              <a:t>11/19/15</a:t>
+              <a:t>12/17/15</a:t>
             </a:fld>
             <a:endParaRPr lang="en-US"/>
           </a:p>
@@ -626,7 +627,7 @@
           <a:p>
             <a:fld id="{68F991EF-D354-4D44-90C4-52C34CD0E879}" type="slidenum">
               <a:rPr lang="en-US" smtClean="0"/>
-              <a:t>2</a:t>
+              <a:t>3</a:t>
             </a:fld>
             <a:endParaRPr lang="en-US"/>
           </a:p>
@@ -826,7 +827,7 @@
           <a:p>
             <a:fld id="{22899599-E8F7-7040-82D8-FDB45990284C}" type="datetimeFigureOut">
               <a:rPr lang="en-US" smtClean="0"/>
-              <a:t>11/16/15</a:t>
+              <a:t>12/17/15</a:t>
             </a:fld>
             <a:endParaRPr lang="en-US"/>
           </a:p>
@@ -996,7 +997,7 @@
           <a:p>
             <a:fld id="{22899599-E8F7-7040-82D8-FDB45990284C}" type="datetimeFigureOut">
               <a:rPr lang="en-US" smtClean="0"/>
-              <a:t>11/16/15</a:t>
+              <a:t>12/17/15</a:t>
             </a:fld>
             <a:endParaRPr lang="en-US"/>
           </a:p>
@@ -1176,7 +1177,7 @@
           <a:p>
             <a:fld id="{22899599-E8F7-7040-82D8-FDB45990284C}" type="datetimeFigureOut">
               <a:rPr lang="en-US" smtClean="0"/>
-              <a:t>11/16/15</a:t>
+              <a:t>12/17/15</a:t>
             </a:fld>
             <a:endParaRPr lang="en-US"/>
           </a:p>
@@ -1346,7 +1347,7 @@
           <a:p>
             <a:fld id="{22899599-E8F7-7040-82D8-FDB45990284C}" type="datetimeFigureOut">
               <a:rPr lang="en-US" smtClean="0"/>
-              <a:t>11/16/15</a:t>
+              <a:t>12/17/15</a:t>
             </a:fld>
             <a:endParaRPr lang="en-US"/>
           </a:p>
@@ -1592,7 +1593,7 @@
           <a:p>
             <a:fld id="{22899599-E8F7-7040-82D8-FDB45990284C}" type="datetimeFigureOut">
               <a:rPr lang="en-US" smtClean="0"/>
-              <a:t>11/16/15</a:t>
+              <a:t>12/17/15</a:t>
             </a:fld>
             <a:endParaRPr lang="en-US"/>
           </a:p>
@@ -1880,7 +1881,7 @@
           <a:p>
             <a:fld id="{22899599-E8F7-7040-82D8-FDB45990284C}" type="datetimeFigureOut">
               <a:rPr lang="en-US" smtClean="0"/>
-              <a:t>11/16/15</a:t>
+              <a:t>12/17/15</a:t>
             </a:fld>
             <a:endParaRPr lang="en-US"/>
           </a:p>
@@ -2302,7 +2303,7 @@
           <a:p>
             <a:fld id="{22899599-E8F7-7040-82D8-FDB45990284C}" type="datetimeFigureOut">
               <a:rPr lang="en-US" smtClean="0"/>
-              <a:t>11/16/15</a:t>
+              <a:t>12/17/15</a:t>
             </a:fld>
             <a:endParaRPr lang="en-US"/>
           </a:p>
@@ -2420,7 +2421,7 @@
           <a:p>
             <a:fld id="{22899599-E8F7-7040-82D8-FDB45990284C}" type="datetimeFigureOut">
               <a:rPr lang="en-US" smtClean="0"/>
-              <a:t>11/16/15</a:t>
+              <a:t>12/17/15</a:t>
             </a:fld>
             <a:endParaRPr lang="en-US"/>
           </a:p>
@@ -2515,7 +2516,7 @@
           <a:p>
             <a:fld id="{22899599-E8F7-7040-82D8-FDB45990284C}" type="datetimeFigureOut">
               <a:rPr lang="en-US" smtClean="0"/>
-              <a:t>11/16/15</a:t>
+              <a:t>12/17/15</a:t>
             </a:fld>
             <a:endParaRPr lang="en-US"/>
           </a:p>
@@ -2792,7 +2793,7 @@
           <a:p>
             <a:fld id="{22899599-E8F7-7040-82D8-FDB45990284C}" type="datetimeFigureOut">
               <a:rPr lang="en-US" smtClean="0"/>
-              <a:t>11/16/15</a:t>
+              <a:t>12/17/15</a:t>
             </a:fld>
             <a:endParaRPr lang="en-US"/>
           </a:p>
@@ -3045,7 +3046,7 @@
           <a:p>
             <a:fld id="{22899599-E8F7-7040-82D8-FDB45990284C}" type="datetimeFigureOut">
               <a:rPr lang="en-US" smtClean="0"/>
-              <a:t>11/16/15</a:t>
+              <a:t>12/17/15</a:t>
             </a:fld>
             <a:endParaRPr lang="en-US"/>
           </a:p>
@@ -3258,7 +3259,7 @@
           <a:p>
             <a:fld id="{22899599-E8F7-7040-82D8-FDB45990284C}" type="datetimeFigureOut">
               <a:rPr lang="en-US" smtClean="0"/>
-              <a:t>11/16/15</a:t>
+              <a:t>12/17/15</a:t>
             </a:fld>
             <a:endParaRPr lang="en-US"/>
           </a:p>
@@ -4697,19 +4698,7 @@
                 <a:latin typeface="Century Gothic"/>
                 <a:cs typeface="Century Gothic"/>
               </a:rPr>
-              <a:t> COMPAÑIAS/</a:t>
-            </a:r>
-            <a:r>
-              <a:rPr lang="en-US" b="1" dirty="0" smtClean="0">
-                <a:solidFill>
-                  <a:schemeClr val="bg1">
-                    <a:lumMod val="95000"/>
-                  </a:schemeClr>
-                </a:solidFill>
-                <a:latin typeface="Century Gothic"/>
-                <a:cs typeface="Century Gothic"/>
-              </a:rPr>
-              <a:t>SERVICIOS</a:t>
+              <a:t> COMPAÑIAS/SERVICIOS</a:t>
             </a:r>
           </a:p>
         </p:txBody>
@@ -5277,6 +5266,78 @@
       </p:grpSpPr>
       <p:sp>
         <p:nvSpPr>
+          <p:cNvPr id="2" name="Title 1"/>
+          <p:cNvSpPr>
+            <a:spLocks noGrp="1"/>
+          </p:cNvSpPr>
+          <p:nvPr>
+            <p:ph type="title"/>
+          </p:nvPr>
+        </p:nvSpPr>
+        <p:spPr/>
+        <p:txBody>
+          <a:bodyPr/>
+          <a:lstStyle/>
+          <a:p>
+            <a:endParaRPr lang="en-US"/>
+          </a:p>
+        </p:txBody>
+      </p:sp>
+      <p:sp>
+        <p:nvSpPr>
+          <p:cNvPr id="3" name="Content Placeholder 2"/>
+          <p:cNvSpPr>
+            <a:spLocks noGrp="1"/>
+          </p:cNvSpPr>
+          <p:nvPr>
+            <p:ph idx="1"/>
+          </p:nvPr>
+        </p:nvSpPr>
+        <p:spPr/>
+        <p:txBody>
+          <a:bodyPr/>
+          <a:lstStyle/>
+          <a:p>
+            <a:r>
+              <a:rPr lang="is-IS"/>
+              <a:t>77378273</a:t>
+            </a:r>
+            <a:endParaRPr lang="en-US"/>
+          </a:p>
+        </p:txBody>
+      </p:sp>
+    </p:spTree>
+    <p:extLst>
+      <p:ext uri="{BB962C8B-B14F-4D97-AF65-F5344CB8AC3E}">
+        <p14:creationId xmlns:p14="http://schemas.microsoft.com/office/powerpoint/2010/main" val="1397505723"/>
+      </p:ext>
+    </p:extLst>
+  </p:cSld>
+  <p:clrMapOvr>
+    <a:masterClrMapping/>
+  </p:clrMapOvr>
+</p:sld>
+</file>
+
+<file path=ppt/slides/slide3.xml><?xml version="1.0" encoding="utf-8"?>
+<p:sld xmlns:a="http://schemas.openxmlformats.org/drawingml/2006/main" xmlns:r="http://schemas.openxmlformats.org/officeDocument/2006/relationships" xmlns:p="http://schemas.openxmlformats.org/presentationml/2006/main">
+  <p:cSld>
+    <p:spTree>
+      <p:nvGrpSpPr>
+        <p:cNvPr id="1" name=""/>
+        <p:cNvGrpSpPr/>
+        <p:nvPr/>
+      </p:nvGrpSpPr>
+      <p:grpSpPr>
+        <a:xfrm>
+          <a:off x="0" y="0"/>
+          <a:ext cx="0" cy="0"/>
+          <a:chOff x="0" y="0"/>
+          <a:chExt cx="0" cy="0"/>
+        </a:xfrm>
+      </p:grpSpPr>
+      <p:sp>
+        <p:nvSpPr>
           <p:cNvPr id="5" name="Rectangle 4"/>
           <p:cNvSpPr/>
           <p:nvPr/>
@@ -5708,7 +5769,7 @@
 </p:sld>
 </file>
 
-<file path=ppt/slides/slide3.xml><?xml version="1.0" encoding="utf-8"?>
+<file path=ppt/slides/slide4.xml><?xml version="1.0" encoding="utf-8"?>
 <p:sld xmlns:a="http://schemas.openxmlformats.org/drawingml/2006/main" xmlns:r="http://schemas.openxmlformats.org/officeDocument/2006/relationships" xmlns:p="http://schemas.openxmlformats.org/presentationml/2006/main">
   <p:cSld>
     <p:spTree>
@@ -6451,13 +6512,6 @@
               </a:rPr>
               <a:t>Create your Account</a:t>
             </a:r>
-            <a:endParaRPr lang="en-US" b="1" dirty="0" smtClean="0">
-              <a:solidFill>
-                <a:srgbClr val="46516D"/>
-              </a:solidFill>
-              <a:latin typeface="Century Gothic"/>
-              <a:cs typeface="Century Gothic"/>
-            </a:endParaRPr>
           </a:p>
         </p:txBody>
       </p:sp>
@@ -6474,7 +6528,7 @@
 </p:sld>
 </file>
 
-<file path=ppt/slides/slide4.xml><?xml version="1.0" encoding="utf-8"?>
+<file path=ppt/slides/slide5.xml><?xml version="1.0" encoding="utf-8"?>
 <p:sld xmlns:a="http://schemas.openxmlformats.org/drawingml/2006/main" xmlns:r="http://schemas.openxmlformats.org/officeDocument/2006/relationships" xmlns:p="http://schemas.openxmlformats.org/presentationml/2006/main">
   <p:cSld>
     <p:spTree>
@@ -7154,13 +7208,6 @@
               </a:rPr>
               <a:t>Enhance your Profile</a:t>
             </a:r>
-            <a:endParaRPr lang="en-US" b="1" dirty="0" smtClean="0">
-              <a:solidFill>
-                <a:srgbClr val="46516D"/>
-              </a:solidFill>
-              <a:latin typeface="Century Gothic"/>
-              <a:cs typeface="Century Gothic"/>
-            </a:endParaRPr>
           </a:p>
         </p:txBody>
       </p:sp>
@@ -7240,7 +7287,7 @@
 </p:sld>
 </file>
 
-<file path=ppt/slides/slide5.xml><?xml version="1.0" encoding="utf-8"?>
+<file path=ppt/slides/slide6.xml><?xml version="1.0" encoding="utf-8"?>
 <p:sld xmlns:a="http://schemas.openxmlformats.org/drawingml/2006/main" xmlns:r="http://schemas.openxmlformats.org/officeDocument/2006/relationships" xmlns:p="http://schemas.openxmlformats.org/presentationml/2006/main">
   <p:cSld>
     <p:spTree>
@@ -7760,15 +7807,6 @@
               </a:rPr>
               <a:t> a Service Contract</a:t>
             </a:r>
-            <a:endParaRPr lang="en-US" b="1" dirty="0" smtClean="0">
-              <a:solidFill>
-                <a:schemeClr val="bg1">
-                  <a:lumMod val="95000"/>
-                </a:schemeClr>
-              </a:solidFill>
-              <a:latin typeface="Century Gothic"/>
-              <a:cs typeface="Century Gothic"/>
-            </a:endParaRPr>
           </a:p>
         </p:txBody>
       </p:sp>
@@ -7978,19 +8016,7 @@
                 <a:latin typeface="Century Gothic"/>
                 <a:cs typeface="Century Gothic"/>
               </a:rPr>
-              <a:t>2</a:t>
-            </a:r>
-            <a:r>
-              <a:rPr lang="en-US" sz="2200" b="1" dirty="0" smtClean="0">
-                <a:solidFill>
-                  <a:schemeClr val="bg1">
-                    <a:lumMod val="95000"/>
-                  </a:schemeClr>
-                </a:solidFill>
-                <a:latin typeface="Century Gothic"/>
-                <a:cs typeface="Century Gothic"/>
-              </a:rPr>
-              <a:t>) ADD</a:t>
+              <a:t>2) ADD</a:t>
             </a:r>
             <a:r>
               <a:rPr lang="en-US" b="1" dirty="0" smtClean="0">
@@ -8004,15 +8030,6 @@
               </a:rPr>
               <a:t> a Provider/Employee</a:t>
             </a:r>
-            <a:endParaRPr lang="en-US" b="1" dirty="0" smtClean="0">
-              <a:solidFill>
-                <a:schemeClr val="bg1">
-                  <a:lumMod val="95000"/>
-                </a:schemeClr>
-              </a:solidFill>
-              <a:latin typeface="Century Gothic"/>
-              <a:cs typeface="Century Gothic"/>
-            </a:endParaRPr>
           </a:p>
         </p:txBody>
       </p:sp>
@@ -8091,15 +8108,6 @@
               </a:rPr>
               <a:t> a SLA</a:t>
             </a:r>
-            <a:endParaRPr lang="en-US" b="1" dirty="0" smtClean="0">
-              <a:solidFill>
-                <a:schemeClr val="bg1">
-                  <a:lumMod val="95000"/>
-                </a:schemeClr>
-              </a:solidFill>
-              <a:latin typeface="Century Gothic"/>
-              <a:cs typeface="Century Gothic"/>
-            </a:endParaRPr>
           </a:p>
         </p:txBody>
       </p:sp>
@@ -8152,19 +8160,7 @@
                 <a:latin typeface="Century Gothic"/>
                 <a:cs typeface="Century Gothic"/>
               </a:rPr>
-              <a:t>4</a:t>
-            </a:r>
-            <a:r>
-              <a:rPr lang="en-US" sz="2200" b="1" dirty="0" smtClean="0">
-                <a:solidFill>
-                  <a:schemeClr val="bg1">
-                    <a:lumMod val="95000"/>
-                  </a:schemeClr>
-                </a:solidFill>
-                <a:latin typeface="Century Gothic"/>
-                <a:cs typeface="Century Gothic"/>
-              </a:rPr>
-              <a:t>) PANEL</a:t>
+              <a:t>4) PANEL</a:t>
             </a:r>
             <a:endParaRPr lang="en-US" b="1" dirty="0" smtClean="0">
               <a:solidFill>
@@ -8191,7 +8187,7 @@
 </p:sld>
 </file>
 
-<file path=ppt/slides/slide6.xml><?xml version="1.0" encoding="utf-8"?>
+<file path=ppt/slides/slide7.xml><?xml version="1.0" encoding="utf-8"?>
 <p:sld xmlns:a="http://schemas.openxmlformats.org/drawingml/2006/main" xmlns:r="http://schemas.openxmlformats.org/officeDocument/2006/relationships" xmlns:p="http://schemas.openxmlformats.org/presentationml/2006/main">
   <p:cSld>
     <p:spTree>

</xml_diff>